<commit_message>
[Add] New Analysis and Update README
</commit_message>
<xml_diff>
--- a/Lending Club Case Study.pptx
+++ b/Lending Club Case Study.pptx
@@ -350,7 +350,7 @@
           <a:p>
             <a:fld id="{4AAD347D-5ACD-4C99-B74B-A9C85AD731AF}" type="datetimeFigureOut">
               <a:rPr lang="en-US" dirty="0"/>
-              <a:t>5/1/2024</a:t>
+              <a:t>5/2/2024</a:t>
             </a:fld>
             <a:endParaRPr lang="en-US" dirty="0"/>
           </a:p>
@@ -620,7 +620,7 @@
           <a:p>
             <a:fld id="{4509A250-FF31-4206-8172-F9D3106AACB1}" type="datetimeFigureOut">
               <a:rPr lang="en-US" dirty="0"/>
-              <a:t>5/1/2024</a:t>
+              <a:t>5/2/2024</a:t>
             </a:fld>
             <a:endParaRPr lang="en-US" dirty="0"/>
           </a:p>
@@ -813,7 +813,7 @@
           <a:p>
             <a:fld id="{4509A250-FF31-4206-8172-F9D3106AACB1}" type="datetimeFigureOut">
               <a:rPr lang="en-US" dirty="0"/>
-              <a:t>5/1/2024</a:t>
+              <a:t>5/2/2024</a:t>
             </a:fld>
             <a:endParaRPr lang="en-US" dirty="0"/>
           </a:p>
@@ -1085,7 +1085,7 @@
           <a:p>
             <a:fld id="{4509A250-FF31-4206-8172-F9D3106AACB1}" type="datetimeFigureOut">
               <a:rPr lang="en-US" dirty="0"/>
-              <a:t>5/1/2024</a:t>
+              <a:t>5/2/2024</a:t>
             </a:fld>
             <a:endParaRPr lang="en-US" dirty="0"/>
           </a:p>
@@ -1425,7 +1425,7 @@
           <a:p>
             <a:fld id="{4509A250-FF31-4206-8172-F9D3106AACB1}" type="datetimeFigureOut">
               <a:rPr lang="en-US" dirty="0"/>
-              <a:t>5/1/2024</a:t>
+              <a:t>5/2/2024</a:t>
             </a:fld>
             <a:endParaRPr lang="en-US" dirty="0"/>
           </a:p>
@@ -2047,7 +2047,7 @@
           <a:p>
             <a:fld id="{4509A250-FF31-4206-8172-F9D3106AACB1}" type="datetimeFigureOut">
               <a:rPr lang="en-US" dirty="0"/>
-              <a:t>5/1/2024</a:t>
+              <a:t>5/2/2024</a:t>
             </a:fld>
             <a:endParaRPr lang="en-US" dirty="0"/>
           </a:p>
@@ -2894,7 +2894,7 @@
           <a:p>
             <a:fld id="{4509A250-FF31-4206-8172-F9D3106AACB1}" type="datetimeFigureOut">
               <a:rPr lang="en-US" dirty="0"/>
-              <a:t>5/1/2024</a:t>
+              <a:t>5/2/2024</a:t>
             </a:fld>
             <a:endParaRPr lang="en-US" dirty="0"/>
           </a:p>
@@ -3062,7 +3062,7 @@
           <a:p>
             <a:fld id="{4509A250-FF31-4206-8172-F9D3106AACB1}" type="datetimeFigureOut">
               <a:rPr lang="en-US" dirty="0"/>
-              <a:t>5/1/2024</a:t>
+              <a:t>5/2/2024</a:t>
             </a:fld>
             <a:endParaRPr lang="en-US" dirty="0"/>
           </a:p>
@@ -3240,7 +3240,7 @@
           <a:p>
             <a:fld id="{4509A250-FF31-4206-8172-F9D3106AACB1}" type="datetimeFigureOut">
               <a:rPr lang="en-US" dirty="0"/>
-              <a:t>5/1/2024</a:t>
+              <a:t>5/2/2024</a:t>
             </a:fld>
             <a:endParaRPr lang="en-US" dirty="0"/>
           </a:p>
@@ -3408,7 +3408,7 @@
           <a:p>
             <a:fld id="{4509A250-FF31-4206-8172-F9D3106AACB1}" type="datetimeFigureOut">
               <a:rPr lang="en-US" dirty="0"/>
-              <a:t>5/1/2024</a:t>
+              <a:t>5/2/2024</a:t>
             </a:fld>
             <a:endParaRPr lang="en-US" dirty="0"/>
           </a:p>
@@ -3654,7 +3654,7 @@
           <a:p>
             <a:fld id="{9796027F-7875-4030-9381-8BD8C4F21935}" type="datetimeFigureOut">
               <a:rPr lang="en-US" dirty="0"/>
-              <a:t>5/1/2024</a:t>
+              <a:t>5/2/2024</a:t>
             </a:fld>
             <a:endParaRPr lang="en-US" dirty="0"/>
           </a:p>
@@ -3943,7 +3943,7 @@
           <a:p>
             <a:fld id="{9796027F-7875-4030-9381-8BD8C4F21935}" type="datetimeFigureOut">
               <a:rPr lang="en-US" dirty="0"/>
-              <a:t>5/1/2024</a:t>
+              <a:t>5/2/2024</a:t>
             </a:fld>
             <a:endParaRPr lang="en-US" dirty="0"/>
           </a:p>
@@ -4384,7 +4384,7 @@
           <a:p>
             <a:fld id="{9796027F-7875-4030-9381-8BD8C4F21935}" type="datetimeFigureOut">
               <a:rPr lang="en-US" dirty="0"/>
-              <a:t>5/1/2024</a:t>
+              <a:t>5/2/2024</a:t>
             </a:fld>
             <a:endParaRPr lang="en-US" dirty="0"/>
           </a:p>
@@ -4501,7 +4501,7 @@
           <a:p>
             <a:fld id="{4509A250-FF31-4206-8172-F9D3106AACB1}" type="datetimeFigureOut">
               <a:rPr lang="en-US" dirty="0"/>
-              <a:t>5/1/2024</a:t>
+              <a:t>5/2/2024</a:t>
             </a:fld>
             <a:endParaRPr lang="en-US" dirty="0"/>
           </a:p>
@@ -4596,7 +4596,7 @@
           <a:p>
             <a:fld id="{4509A250-FF31-4206-8172-F9D3106AACB1}" type="datetimeFigureOut">
               <a:rPr lang="en-US" dirty="0"/>
-              <a:t>5/1/2024</a:t>
+              <a:t>5/2/2024</a:t>
             </a:fld>
             <a:endParaRPr lang="en-US" dirty="0"/>
           </a:p>
@@ -4873,7 +4873,7 @@
           <a:p>
             <a:fld id="{4509A250-FF31-4206-8172-F9D3106AACB1}" type="datetimeFigureOut">
               <a:rPr lang="en-US" dirty="0"/>
-              <a:t>5/1/2024</a:t>
+              <a:t>5/2/2024</a:t>
             </a:fld>
             <a:endParaRPr lang="en-US" dirty="0"/>
           </a:p>
@@ -5143,7 +5143,7 @@
           <a:p>
             <a:fld id="{4509A250-FF31-4206-8172-F9D3106AACB1}" type="datetimeFigureOut">
               <a:rPr lang="en-US" dirty="0"/>
-              <a:t>5/1/2024</a:t>
+              <a:t>5/2/2024</a:t>
             </a:fld>
             <a:endParaRPr lang="en-US" dirty="0"/>
           </a:p>
@@ -5570,7 +5570,7 @@
           <a:p>
             <a:fld id="{4AAD347D-5ACD-4C99-B74B-A9C85AD731AF}" type="datetimeFigureOut">
               <a:rPr lang="en-US" dirty="0"/>
-              <a:t>5/1/2024</a:t>
+              <a:t>5/2/2024</a:t>
             </a:fld>
             <a:endParaRPr lang="en-US" dirty="0"/>
           </a:p>
@@ -6914,161 +6914,173 @@
           </a:p>
         </p:txBody>
       </p:sp>
+      <p:sp>
+        <p:nvSpPr>
+          <p:cNvPr id="7" name="Rectangle 6"/>
+          <p:cNvSpPr/>
+          <p:nvPr/>
+        </p:nvSpPr>
+        <p:spPr>
+          <a:xfrm>
+            <a:off x="168439" y="852564"/>
+            <a:ext cx="7010283" cy="369332"/>
+          </a:xfrm>
+          <a:prstGeom prst="rect">
+            <a:avLst/>
+          </a:prstGeom>
+        </p:spPr>
+        <p:txBody>
+          <a:bodyPr wrap="square">
+            <a:spAutoFit/>
+          </a:bodyPr>
+          <a:lstStyle/>
+          <a:p>
+            <a:r>
+              <a:rPr lang="en-IN" b="1" dirty="0"/>
+              <a:t>Loan Amount vs. Debt-to-Income Ratio (Scatter Plot) </a:t>
+            </a:r>
+          </a:p>
+        </p:txBody>
+      </p:sp>
+      <p:sp>
+        <p:nvSpPr>
+          <p:cNvPr id="10" name="Rectangle 9"/>
+          <p:cNvSpPr/>
+          <p:nvPr/>
+        </p:nvSpPr>
+        <p:spPr>
+          <a:xfrm>
+            <a:off x="665773" y="1335475"/>
+            <a:ext cx="10948068" cy="1077218"/>
+          </a:xfrm>
+          <a:prstGeom prst="rect">
+            <a:avLst/>
+          </a:prstGeom>
+        </p:spPr>
+        <p:txBody>
+          <a:bodyPr wrap="square">
+            <a:spAutoFit/>
+          </a:bodyPr>
+          <a:lstStyle/>
+          <a:p>
+            <a:r>
+              <a:rPr lang="en-US" sz="1600" dirty="0">
+                <a:latin typeface="Söhne"/>
+              </a:rPr>
+              <a:t># Below represents in X-axis is loan amount requested by borrowers. Each points position along the x-axis is size of loan. </a:t>
+            </a:r>
+          </a:p>
+          <a:p>
+            <a:r>
+              <a:rPr lang="en-US" sz="1600" dirty="0">
+                <a:latin typeface="Söhne"/>
+              </a:rPr>
+              <a:t># And in Y-axis, represents the debt-to-income ratio, which is the ratio of a borrower's total monthly debt payments to their monthly gross income. Each point's position along this y-axis signifies the borrower's DTI ratio.</a:t>
+            </a:r>
+          </a:p>
+        </p:txBody>
+      </p:sp>
+      <p:sp>
+        <p:nvSpPr>
+          <p:cNvPr id="11" name="Rectangle 10"/>
+          <p:cNvSpPr/>
+          <p:nvPr/>
+        </p:nvSpPr>
+        <p:spPr>
+          <a:xfrm>
+            <a:off x="665773" y="2957160"/>
+            <a:ext cx="4735133" cy="2554545"/>
+          </a:xfrm>
+          <a:prstGeom prst="rect">
+            <a:avLst/>
+          </a:prstGeom>
+        </p:spPr>
+        <p:txBody>
+          <a:bodyPr wrap="square">
+            <a:spAutoFit/>
+          </a:bodyPr>
+          <a:lstStyle/>
+          <a:p>
+            <a:r>
+              <a:rPr lang="en-US" sz="1600" b="1" dirty="0">
+                <a:latin typeface="Söhne"/>
+              </a:rPr>
+              <a:t>Business Implications:-</a:t>
+            </a:r>
+          </a:p>
+          <a:p>
+            <a:r>
+              <a:rPr lang="en-US" sz="1600" dirty="0"/>
+              <a:t>#Risk Assessment </a:t>
+            </a:r>
+            <a:r>
+              <a:rPr lang="en-US" sz="1600" dirty="0">
+                <a:sym typeface="Wingdings" panose="05000000000000000000" pitchFamily="2" charset="2"/>
+              </a:rPr>
+              <a:t> </a:t>
+            </a:r>
+            <a:r>
+              <a:rPr lang="en-US" sz="1600" b="1" dirty="0"/>
+              <a:t>High Loan Amounts with High DTI </a:t>
+            </a:r>
+            <a:r>
+              <a:rPr lang="en-US" sz="1600" b="1" dirty="0">
+                <a:sym typeface="Wingdings" panose="05000000000000000000" pitchFamily="2" charset="2"/>
+              </a:rPr>
+              <a:t> </a:t>
+            </a:r>
+            <a:r>
+              <a:rPr lang="en-US" sz="1600" dirty="0"/>
+              <a:t>Points clustered at high loan amounts and high DTI ratios may indicate borrowers with potentially higher financial risk.</a:t>
+            </a:r>
+          </a:p>
+          <a:p>
+            <a:br>
+              <a:rPr lang="en-US" sz="1600" dirty="0"/>
+            </a:br>
+            <a:r>
+              <a:rPr lang="en-US" sz="1600" dirty="0"/>
+              <a:t>from scatter plot – it indicates that high DTI ratio is 25 &amp; till amounts ($20000) when compared between DTI ratio between 25 – 30 &amp; Loan amounts between $20000 - $ 30000</a:t>
+            </a:r>
+          </a:p>
+        </p:txBody>
+      </p:sp>
       <p:pic>
         <p:nvPicPr>
-          <p:cNvPr id="5" name="Picture 4"/>
+          <p:cNvPr id="4" name="Picture 3">
+            <a:extLst>
+              <a:ext uri="{FF2B5EF4-FFF2-40B4-BE49-F238E27FC236}">
+                <a16:creationId xmlns:a16="http://schemas.microsoft.com/office/drawing/2014/main" id="{08B6D0DF-2AF9-46C3-8705-3A6215DB5988}"/>
+              </a:ext>
+            </a:extLst>
+          </p:cNvPr>
           <p:cNvPicPr>
             <a:picLocks noChangeAspect="1"/>
           </p:cNvPicPr>
           <p:nvPr/>
         </p:nvPicPr>
         <p:blipFill>
-          <a:blip r:embed="rId2"/>
+          <a:blip r:embed="rId2">
+            <a:extLst>
+              <a:ext uri="{28A0092B-C50C-407E-A947-70E740481C1C}">
+                <a14:useLocalDpi xmlns:a14="http://schemas.microsoft.com/office/drawing/2010/main" val="0"/>
+              </a:ext>
+            </a:extLst>
+          </a:blip>
           <a:stretch>
             <a:fillRect/>
           </a:stretch>
         </p:blipFill>
         <p:spPr>
           <a:xfrm>
-            <a:off x="5600246" y="2701831"/>
-            <a:ext cx="6440421" cy="4026516"/>
+            <a:off x="5176866" y="2828925"/>
+            <a:ext cx="6948459" cy="3835665"/>
           </a:xfrm>
           <a:prstGeom prst="rect">
             <a:avLst/>
           </a:prstGeom>
         </p:spPr>
       </p:pic>
-      <p:sp>
-        <p:nvSpPr>
-          <p:cNvPr id="7" name="Rectangle 6"/>
-          <p:cNvSpPr/>
-          <p:nvPr/>
-        </p:nvSpPr>
-        <p:spPr>
-          <a:xfrm>
-            <a:off x="168439" y="852564"/>
-            <a:ext cx="7010283" cy="369332"/>
-          </a:xfrm>
-          <a:prstGeom prst="rect">
-            <a:avLst/>
-          </a:prstGeom>
-        </p:spPr>
-        <p:txBody>
-          <a:bodyPr wrap="square">
-            <a:spAutoFit/>
-          </a:bodyPr>
-          <a:lstStyle/>
-          <a:p>
-            <a:r>
-              <a:rPr lang="en-IN" b="1" dirty="0"/>
-              <a:t>Loan Amount vs. Debt-to-Income Ratio (Scatter Plot) </a:t>
-            </a:r>
-          </a:p>
-        </p:txBody>
-      </p:sp>
-      <p:sp>
-        <p:nvSpPr>
-          <p:cNvPr id="10" name="Rectangle 9"/>
-          <p:cNvSpPr/>
-          <p:nvPr/>
-        </p:nvSpPr>
-        <p:spPr>
-          <a:xfrm>
-            <a:off x="665773" y="1335475"/>
-            <a:ext cx="10948068" cy="1077218"/>
-          </a:xfrm>
-          <a:prstGeom prst="rect">
-            <a:avLst/>
-          </a:prstGeom>
-        </p:spPr>
-        <p:txBody>
-          <a:bodyPr wrap="square">
-            <a:spAutoFit/>
-          </a:bodyPr>
-          <a:lstStyle/>
-          <a:p>
-            <a:r>
-              <a:rPr lang="en-US" sz="1600" dirty="0">
-                <a:latin typeface="Söhne"/>
-              </a:rPr>
-              <a:t># Below represents in X-axis is loan amount requested by borrowers. Each points position along the x-axis is size of loan. </a:t>
-            </a:r>
-          </a:p>
-          <a:p>
-            <a:r>
-              <a:rPr lang="en-US" sz="1600" dirty="0">
-                <a:latin typeface="Söhne"/>
-              </a:rPr>
-              <a:t># And in Y-axis, represents the debt-to-income ratio, which is the ratio of a borrower's total monthly debt payments to their monthly gross income. Each point's position along this y-axis signifies the borrower's DTI ratio.</a:t>
-            </a:r>
-          </a:p>
-        </p:txBody>
-      </p:sp>
-      <p:sp>
-        <p:nvSpPr>
-          <p:cNvPr id="11" name="Rectangle 10"/>
-          <p:cNvSpPr/>
-          <p:nvPr/>
-        </p:nvSpPr>
-        <p:spPr>
-          <a:xfrm>
-            <a:off x="665773" y="2957160"/>
-            <a:ext cx="4735133" cy="2554545"/>
-          </a:xfrm>
-          <a:prstGeom prst="rect">
-            <a:avLst/>
-          </a:prstGeom>
-        </p:spPr>
-        <p:txBody>
-          <a:bodyPr wrap="square">
-            <a:spAutoFit/>
-          </a:bodyPr>
-          <a:lstStyle/>
-          <a:p>
-            <a:r>
-              <a:rPr lang="en-US" sz="1600" b="1" dirty="0">
-                <a:latin typeface="Söhne"/>
-              </a:rPr>
-              <a:t>Business Implications:-</a:t>
-            </a:r>
-          </a:p>
-          <a:p>
-            <a:r>
-              <a:rPr lang="en-US" sz="1600" dirty="0"/>
-              <a:t>#Risk Assessment </a:t>
-            </a:r>
-            <a:r>
-              <a:rPr lang="en-US" sz="1600" dirty="0">
-                <a:sym typeface="Wingdings" panose="05000000000000000000" pitchFamily="2" charset="2"/>
-              </a:rPr>
-              <a:t> </a:t>
-            </a:r>
-            <a:r>
-              <a:rPr lang="en-US" sz="1600" b="1" dirty="0"/>
-              <a:t>High Loan Amounts with High DTI </a:t>
-            </a:r>
-            <a:r>
-              <a:rPr lang="en-US" sz="1600" b="1" dirty="0">
-                <a:sym typeface="Wingdings" panose="05000000000000000000" pitchFamily="2" charset="2"/>
-              </a:rPr>
-              <a:t> </a:t>
-            </a:r>
-            <a:r>
-              <a:rPr lang="en-US" sz="1600" dirty="0"/>
-              <a:t>Points clustered at high loan amounts and high DTI ratios may indicate borrowers with potentially higher financial risk.</a:t>
-            </a:r>
-          </a:p>
-          <a:p>
-            <a:br>
-              <a:rPr lang="en-US" sz="1600" dirty="0"/>
-            </a:br>
-            <a:r>
-              <a:rPr lang="en-US" sz="1600" dirty="0"/>
-              <a:t>from scatter plot – it indicates that high DTI ratio is 25 &amp; till amounts ($20000) when compared between DTI ratio between 25 – 30 &amp; Loan amounts between $20000 - $ 30000</a:t>
-            </a:r>
-          </a:p>
-        </p:txBody>
-      </p:sp>
     </p:spTree>
     <p:extLst>
       <p:ext uri="{BB962C8B-B14F-4D97-AF65-F5344CB8AC3E}">

</xml_diff>